<commit_message>
changed documentation ppt and pdf
</commit_message>
<xml_diff>
--- a/Documentation/Project-structure-graphical.pptx
+++ b/Documentation/Project-structure-graphical.pptx
@@ -875,7 +875,7 @@
   <p:cSld>
     <p:spTree>
       <p:nvGrpSpPr>
-        <p:cNvPr id="142" name="Shape 142"/>
+        <p:cNvPr id="143" name="Shape 143"/>
         <p:cNvGrpSpPr/>
         <p:nvPr/>
       </p:nvGrpSpPr>
@@ -889,7 +889,7 @@
       </p:grpSpPr>
       <p:sp>
         <p:nvSpPr>
-          <p:cNvPr id="143" name="Google Shape;143;gb420ddfd5c_0_39:notes"/>
+          <p:cNvPr id="144" name="Google Shape;144;gb420ddfd5c_0_39:notes"/>
           <p:cNvSpPr txBox="1"/>
           <p:nvPr>
             <p:ph idx="1" type="body"/>
@@ -928,7 +928,7 @@
       </p:sp>
       <p:sp>
         <p:nvSpPr>
-          <p:cNvPr id="144" name="Google Shape;144;gb420ddfd5c_0_39:notes"/>
+          <p:cNvPr id="145" name="Google Shape;145;gb420ddfd5c_0_39:notes"/>
           <p:cNvSpPr/>
           <p:nvPr>
             <p:ph idx="2" type="sldImg"/>
@@ -11983,6 +11983,35 @@
           </a:ln>
         </p:spPr>
       </p:cxnSp>
+      <p:cxnSp>
+        <p:nvCxnSpPr>
+          <p:cNvPr id="142" name="Google Shape;142;p15"/>
+          <p:cNvCxnSpPr>
+            <a:stCxn id="102" idx="3"/>
+            <a:endCxn id="110" idx="1"/>
+          </p:cNvCxnSpPr>
+          <p:nvPr/>
+        </p:nvCxnSpPr>
+        <p:spPr>
+          <a:xfrm flipH="1" rot="10800000">
+            <a:off x="6985475" y="1106875"/>
+            <a:ext cx="824100" cy="3199500"/>
+          </a:xfrm>
+          <a:prstGeom prst="straightConnector1">
+            <a:avLst/>
+          </a:prstGeom>
+          <a:noFill/>
+          <a:ln cap="flat" cmpd="sng" w="9525">
+            <a:solidFill>
+              <a:schemeClr val="dk2"/>
+            </a:solidFill>
+            <a:prstDash val="solid"/>
+            <a:round/>
+            <a:headEnd len="med" w="med" type="none"/>
+            <a:tailEnd len="med" w="med" type="triangle"/>
+          </a:ln>
+        </p:spPr>
+      </p:cxnSp>
     </p:spTree>
   </p:cSld>
   <p:clrMapOvr>
@@ -11996,7 +12025,7 @@
   <p:cSld>
     <p:spTree>
       <p:nvGrpSpPr>
-        <p:cNvPr id="145" name="Shape 145"/>
+        <p:cNvPr id="146" name="Shape 146"/>
         <p:cNvGrpSpPr/>
         <p:nvPr/>
       </p:nvGrpSpPr>
@@ -12010,7 +12039,7 @@
       </p:grpSpPr>
       <p:sp>
         <p:nvSpPr>
-          <p:cNvPr id="146" name="Google Shape;146;p16"/>
+          <p:cNvPr id="147" name="Google Shape;147;p16"/>
           <p:cNvSpPr/>
           <p:nvPr/>
         </p:nvSpPr>
@@ -12079,7 +12108,7 @@
       </p:sp>
       <p:sp>
         <p:nvSpPr>
-          <p:cNvPr id="147" name="Google Shape;147;p16"/>
+          <p:cNvPr id="148" name="Google Shape;148;p16"/>
           <p:cNvSpPr/>
           <p:nvPr/>
         </p:nvSpPr>
@@ -12137,7 +12166,7 @@
       </p:sp>
       <p:sp>
         <p:nvSpPr>
-          <p:cNvPr id="148" name="Google Shape;148;p16"/>
+          <p:cNvPr id="149" name="Google Shape;149;p16"/>
           <p:cNvSpPr txBox="1"/>
           <p:nvPr/>
         </p:nvSpPr>
@@ -12188,7 +12217,7 @@
       </p:sp>
       <p:sp>
         <p:nvSpPr>
-          <p:cNvPr id="149" name="Google Shape;149;p16"/>
+          <p:cNvPr id="150" name="Google Shape;150;p16"/>
           <p:cNvSpPr/>
           <p:nvPr/>
         </p:nvSpPr>
@@ -12241,7 +12270,7 @@
       </p:sp>
       <p:sp>
         <p:nvSpPr>
-          <p:cNvPr id="150" name="Google Shape;150;p16"/>
+          <p:cNvPr id="151" name="Google Shape;151;p16"/>
           <p:cNvSpPr/>
           <p:nvPr/>
         </p:nvSpPr>
@@ -12288,83 +12317,6 @@
                 </a:solidFill>
               </a:rPr>
               <a:t>read src file and get as pandas dataframe</a:t>
-            </a:r>
-            <a:endParaRPr sz="1200">
-              <a:solidFill>
-                <a:schemeClr val="dk1"/>
-              </a:solidFill>
-            </a:endParaRPr>
-          </a:p>
-          <a:p>
-            <a:pPr indent="0" lvl="0" marL="457200" rtl="0" algn="ctr">
-              <a:spcBef>
-                <a:spcPts val="0"/>
-              </a:spcBef>
-              <a:spcAft>
-                <a:spcPts val="0"/>
-              </a:spcAft>
-              <a:buNone/>
-            </a:pPr>
-            <a:r>
-              <a:t/>
-            </a:r>
-            <a:endParaRPr sz="1200">
-              <a:solidFill>
-                <a:schemeClr val="dk1"/>
-              </a:solidFill>
-            </a:endParaRPr>
-          </a:p>
-        </p:txBody>
-      </p:sp>
-      <p:sp>
-        <p:nvSpPr>
-          <p:cNvPr id="151" name="Google Shape;151;p16"/>
-          <p:cNvSpPr/>
-          <p:nvPr/>
-        </p:nvSpPr>
-        <p:spPr>
-          <a:xfrm>
-            <a:off x="4244575" y="1999750"/>
-            <a:ext cx="2251800" cy="519000"/>
-          </a:xfrm>
-          <a:prstGeom prst="rect">
-            <a:avLst/>
-          </a:prstGeom>
-          <a:solidFill>
-            <a:srgbClr val="A2C4C9"/>
-          </a:solidFill>
-          <a:ln cap="flat" cmpd="sng" w="25400">
-            <a:solidFill>
-              <a:srgbClr val="42719B"/>
-            </a:solidFill>
-            <a:prstDash val="solid"/>
-            <a:miter lim="8000"/>
-            <a:headEnd len="sm" w="sm" type="none"/>
-            <a:tailEnd len="sm" w="sm" type="none"/>
-          </a:ln>
-        </p:spPr>
-        <p:txBody>
-          <a:bodyPr anchorCtr="0" anchor="t" bIns="91425" lIns="91425" spcFirstLastPara="1" rIns="91425" wrap="square" tIns="91425">
-            <a:noAutofit/>
-          </a:bodyPr>
-          <a:lstStyle/>
-          <a:p>
-            <a:pPr indent="0" lvl="0" marL="0" rtl="0" algn="ctr">
-              <a:spcBef>
-                <a:spcPts val="0"/>
-              </a:spcBef>
-              <a:spcAft>
-                <a:spcPts val="0"/>
-              </a:spcAft>
-              <a:buNone/>
-            </a:pPr>
-            <a:r>
-              <a:rPr lang="de-DE" sz="1200">
-                <a:solidFill>
-                  <a:schemeClr val="dk1"/>
-                </a:solidFill>
-              </a:rPr>
-              <a:t>replace the header to handle dataframes</a:t>
             </a:r>
             <a:endParaRPr sz="1200">
               <a:solidFill>
@@ -12401,7 +12353,7 @@
         </p:nvSpPr>
         <p:spPr>
           <a:xfrm>
-            <a:off x="4244575" y="2533150"/>
+            <a:off x="4244575" y="1999750"/>
             <a:ext cx="2251800" cy="519000"/>
           </a:xfrm>
           <a:prstGeom prst="rect">
@@ -12441,7 +12393,7 @@
                   <a:schemeClr val="dk1"/>
                 </a:solidFill>
               </a:rPr>
-              <a:t>reset index and eliminate null columns</a:t>
+              <a:t>replace the header to handle dataframes</a:t>
             </a:r>
             <a:endParaRPr sz="1200">
               <a:solidFill>
@@ -12478,7 +12430,7 @@
         </p:nvSpPr>
         <p:spPr>
           <a:xfrm>
-            <a:off x="4244575" y="3066550"/>
+            <a:off x="4244575" y="2533150"/>
             <a:ext cx="2251800" cy="519000"/>
           </a:xfrm>
           <a:prstGeom prst="rect">
@@ -12518,7 +12470,7 @@
                   <a:schemeClr val="dk1"/>
                 </a:solidFill>
               </a:rPr>
-              <a:t>Generate grading file for each supervisor</a:t>
+              <a:t>reset index and eliminate null columns</a:t>
             </a:r>
             <a:endParaRPr sz="1200">
               <a:solidFill>
@@ -12555,8 +12507,85 @@
         </p:nvSpPr>
         <p:spPr>
           <a:xfrm>
+            <a:off x="4244575" y="3066550"/>
+            <a:ext cx="2251800" cy="519000"/>
+          </a:xfrm>
+          <a:prstGeom prst="rect">
+            <a:avLst/>
+          </a:prstGeom>
+          <a:solidFill>
+            <a:srgbClr val="A2C4C9"/>
+          </a:solidFill>
+          <a:ln cap="flat" cmpd="sng" w="25400">
+            <a:solidFill>
+              <a:srgbClr val="42719B"/>
+            </a:solidFill>
+            <a:prstDash val="solid"/>
+            <a:miter lim="8000"/>
+            <a:headEnd len="sm" w="sm" type="none"/>
+            <a:tailEnd len="sm" w="sm" type="none"/>
+          </a:ln>
+        </p:spPr>
+        <p:txBody>
+          <a:bodyPr anchorCtr="0" anchor="t" bIns="91425" lIns="91425" spcFirstLastPara="1" rIns="91425" wrap="square" tIns="91425">
+            <a:noAutofit/>
+          </a:bodyPr>
+          <a:lstStyle/>
+          <a:p>
+            <a:pPr indent="0" lvl="0" marL="0" rtl="0" algn="ctr">
+              <a:spcBef>
+                <a:spcPts val="0"/>
+              </a:spcBef>
+              <a:spcAft>
+                <a:spcPts val="0"/>
+              </a:spcAft>
+              <a:buNone/>
+            </a:pPr>
+            <a:r>
+              <a:rPr lang="de-DE" sz="1200">
+                <a:solidFill>
+                  <a:schemeClr val="dk1"/>
+                </a:solidFill>
+              </a:rPr>
+              <a:t>Generate grading file for each supervisor</a:t>
+            </a:r>
+            <a:endParaRPr sz="1200">
+              <a:solidFill>
+                <a:schemeClr val="dk1"/>
+              </a:solidFill>
+            </a:endParaRPr>
+          </a:p>
+          <a:p>
+            <a:pPr indent="0" lvl="0" marL="457200" rtl="0" algn="ctr">
+              <a:spcBef>
+                <a:spcPts val="0"/>
+              </a:spcBef>
+              <a:spcAft>
+                <a:spcPts val="0"/>
+              </a:spcAft>
+              <a:buNone/>
+            </a:pPr>
+            <a:r>
+              <a:t/>
+            </a:r>
+            <a:endParaRPr sz="1200">
+              <a:solidFill>
+                <a:schemeClr val="dk1"/>
+              </a:solidFill>
+            </a:endParaRPr>
+          </a:p>
+        </p:txBody>
+      </p:sp>
+      <p:sp>
+        <p:nvSpPr>
+          <p:cNvPr id="155" name="Google Shape;155;p16"/>
+          <p:cNvSpPr/>
+          <p:nvPr/>
+        </p:nvSpPr>
+        <p:spPr>
+          <a:xfrm>
             <a:off x="591700" y="675800"/>
-            <a:ext cx="3057600" cy="2692800"/>
+            <a:ext cx="3057600" cy="1681200"/>
           </a:xfrm>
           <a:prstGeom prst="roundRect">
             <a:avLst>
@@ -12613,14 +12642,14 @@
       </p:sp>
       <p:sp>
         <p:nvSpPr>
-          <p:cNvPr id="155" name="Google Shape;155;p16"/>
+          <p:cNvPr id="156" name="Google Shape;156;p16"/>
           <p:cNvSpPr/>
           <p:nvPr/>
         </p:nvSpPr>
         <p:spPr>
           <a:xfrm>
             <a:off x="859450" y="1329150"/>
-            <a:ext cx="2522100" cy="1854000"/>
+            <a:ext cx="2522100" cy="877200"/>
           </a:xfrm>
           <a:prstGeom prst="rect">
             <a:avLst/>
@@ -12666,14 +12695,14 @@
       </p:sp>
       <p:sp>
         <p:nvSpPr>
-          <p:cNvPr id="156" name="Google Shape;156;p16"/>
+          <p:cNvPr id="157" name="Google Shape;157;p16"/>
           <p:cNvSpPr/>
           <p:nvPr/>
         </p:nvSpPr>
         <p:spPr>
           <a:xfrm>
             <a:off x="967550" y="1598325"/>
-            <a:ext cx="2251800" cy="311100"/>
+            <a:ext cx="2251800" cy="461700"/>
           </a:xfrm>
           <a:prstGeom prst="rect">
             <a:avLst/>
@@ -12712,84 +12741,7 @@
                   <a:schemeClr val="dk1"/>
                 </a:solidFill>
               </a:rPr>
-              <a:t>path to input file</a:t>
-            </a:r>
-            <a:endParaRPr sz="1200">
-              <a:solidFill>
-                <a:schemeClr val="dk1"/>
-              </a:solidFill>
-            </a:endParaRPr>
-          </a:p>
-          <a:p>
-            <a:pPr indent="0" lvl="0" marL="457200" rtl="0" algn="ctr">
-              <a:spcBef>
-                <a:spcPts val="0"/>
-              </a:spcBef>
-              <a:spcAft>
-                <a:spcPts val="0"/>
-              </a:spcAft>
-              <a:buNone/>
-            </a:pPr>
-            <a:r>
-              <a:t/>
-            </a:r>
-            <a:endParaRPr sz="1200">
-              <a:solidFill>
-                <a:schemeClr val="dk1"/>
-              </a:solidFill>
-            </a:endParaRPr>
-          </a:p>
-        </p:txBody>
-      </p:sp>
-      <p:sp>
-        <p:nvSpPr>
-          <p:cNvPr id="157" name="Google Shape;157;p16"/>
-          <p:cNvSpPr/>
-          <p:nvPr/>
-        </p:nvSpPr>
-        <p:spPr>
-          <a:xfrm>
-            <a:off x="967550" y="1979325"/>
-            <a:ext cx="2251800" cy="519000"/>
-          </a:xfrm>
-          <a:prstGeom prst="rect">
-            <a:avLst/>
-          </a:prstGeom>
-          <a:solidFill>
-            <a:srgbClr val="A2C4C9"/>
-          </a:solidFill>
-          <a:ln cap="flat" cmpd="sng" w="25400">
-            <a:solidFill>
-              <a:srgbClr val="42719B"/>
-            </a:solidFill>
-            <a:prstDash val="solid"/>
-            <a:miter lim="8000"/>
-            <a:headEnd len="sm" w="sm" type="none"/>
-            <a:tailEnd len="sm" w="sm" type="none"/>
-          </a:ln>
-        </p:spPr>
-        <p:txBody>
-          <a:bodyPr anchorCtr="0" anchor="t" bIns="91425" lIns="91425" spcFirstLastPara="1" rIns="91425" wrap="square" tIns="91425">
-            <a:noAutofit/>
-          </a:bodyPr>
-          <a:lstStyle/>
-          <a:p>
-            <a:pPr indent="0" lvl="0" marL="0" rtl="0" algn="ctr">
-              <a:spcBef>
-                <a:spcPts val="0"/>
-              </a:spcBef>
-              <a:spcAft>
-                <a:spcPts val="0"/>
-              </a:spcAft>
-              <a:buNone/>
-            </a:pPr>
-            <a:r>
-              <a:rPr lang="de-DE" sz="1200">
-                <a:solidFill>
-                  <a:schemeClr val="dk1"/>
-                </a:solidFill>
-              </a:rPr>
-              <a:t>-HS Switch to toggle Hauptseminar</a:t>
+              <a:t>any keys that may be required later</a:t>
             </a:r>
             <a:endParaRPr sz="1200">
               <a:solidFill>
@@ -12821,83 +12773,6 @@
       <p:sp>
         <p:nvSpPr>
           <p:cNvPr id="158" name="Google Shape;158;p16"/>
-          <p:cNvSpPr/>
-          <p:nvPr/>
-        </p:nvSpPr>
-        <p:spPr>
-          <a:xfrm>
-            <a:off x="967550" y="2588925"/>
-            <a:ext cx="2251800" cy="519000"/>
-          </a:xfrm>
-          <a:prstGeom prst="rect">
-            <a:avLst/>
-          </a:prstGeom>
-          <a:solidFill>
-            <a:srgbClr val="A2C4C9"/>
-          </a:solidFill>
-          <a:ln cap="flat" cmpd="sng" w="25400">
-            <a:solidFill>
-              <a:srgbClr val="42719B"/>
-            </a:solidFill>
-            <a:prstDash val="solid"/>
-            <a:miter lim="8000"/>
-            <a:headEnd len="sm" w="sm" type="none"/>
-            <a:tailEnd len="sm" w="sm" type="none"/>
-          </a:ln>
-        </p:spPr>
-        <p:txBody>
-          <a:bodyPr anchorCtr="0" anchor="t" bIns="91425" lIns="91425" spcFirstLastPara="1" rIns="91425" wrap="square" tIns="91425">
-            <a:noAutofit/>
-          </a:bodyPr>
-          <a:lstStyle/>
-          <a:p>
-            <a:pPr indent="0" lvl="0" marL="0" rtl="0" algn="ctr">
-              <a:spcBef>
-                <a:spcPts val="0"/>
-              </a:spcBef>
-              <a:spcAft>
-                <a:spcPts val="0"/>
-              </a:spcAft>
-              <a:buNone/>
-            </a:pPr>
-            <a:r>
-              <a:rPr lang="de-DE" sz="1200">
-                <a:solidFill>
-                  <a:schemeClr val="dk1"/>
-                </a:solidFill>
-              </a:rPr>
-              <a:t>--update=&lt;existing masters file&gt; for getting new entries </a:t>
-            </a:r>
-            <a:endParaRPr sz="1200">
-              <a:solidFill>
-                <a:schemeClr val="dk1"/>
-              </a:solidFill>
-            </a:endParaRPr>
-          </a:p>
-          <a:p>
-            <a:pPr indent="0" lvl="0" marL="457200" rtl="0" algn="ctr">
-              <a:spcBef>
-                <a:spcPts val="0"/>
-              </a:spcBef>
-              <a:spcAft>
-                <a:spcPts val="0"/>
-              </a:spcAft>
-              <a:buNone/>
-            </a:pPr>
-            <a:r>
-              <a:t/>
-            </a:r>
-            <a:endParaRPr sz="1200">
-              <a:solidFill>
-                <a:schemeClr val="dk1"/>
-              </a:solidFill>
-            </a:endParaRPr>
-          </a:p>
-        </p:txBody>
-      </p:sp>
-      <p:sp>
-        <p:nvSpPr>
-          <p:cNvPr id="159" name="Google Shape;159;p16"/>
           <p:cNvSpPr/>
           <p:nvPr/>
         </p:nvSpPr>
@@ -12973,7 +12848,7 @@
       </p:sp>
       <p:sp>
         <p:nvSpPr>
-          <p:cNvPr id="160" name="Google Shape;160;p16"/>
+          <p:cNvPr id="159" name="Google Shape;159;p16"/>
           <p:cNvSpPr/>
           <p:nvPr/>
         </p:nvSpPr>
@@ -13025,7 +12900,7 @@
       </p:sp>
       <p:sp>
         <p:nvSpPr>
-          <p:cNvPr id="161" name="Google Shape;161;p16"/>
+          <p:cNvPr id="160" name="Google Shape;160;p16"/>
           <p:cNvSpPr/>
           <p:nvPr/>
         </p:nvSpPr>
@@ -13102,7 +12977,7 @@
       </p:sp>
       <p:sp>
         <p:nvSpPr>
-          <p:cNvPr id="162" name="Google Shape;162;p16"/>
+          <p:cNvPr id="161" name="Google Shape;161;p16"/>
           <p:cNvSpPr/>
           <p:nvPr/>
         </p:nvSpPr>
@@ -13160,7 +13035,7 @@
       </p:sp>
       <p:sp>
         <p:nvSpPr>
-          <p:cNvPr id="163" name="Google Shape;163;p16"/>
+          <p:cNvPr id="162" name="Google Shape;162;p16"/>
           <p:cNvSpPr/>
           <p:nvPr/>
         </p:nvSpPr>
@@ -13237,13 +13112,13 @@
       </p:sp>
       <p:sp>
         <p:nvSpPr>
-          <p:cNvPr id="164" name="Google Shape;164;p16"/>
+          <p:cNvPr id="163" name="Google Shape;163;p16"/>
           <p:cNvSpPr/>
           <p:nvPr/>
         </p:nvSpPr>
         <p:spPr>
           <a:xfrm>
-            <a:off x="638475" y="3514700"/>
+            <a:off x="638475" y="2447900"/>
             <a:ext cx="3057600" cy="1115100"/>
           </a:xfrm>
           <a:prstGeom prst="roundRect">
@@ -13301,13 +13176,13 @@
       </p:sp>
       <p:sp>
         <p:nvSpPr>
-          <p:cNvPr id="165" name="Google Shape;165;p16"/>
+          <p:cNvPr id="164" name="Google Shape;164;p16"/>
           <p:cNvSpPr/>
           <p:nvPr/>
         </p:nvSpPr>
         <p:spPr>
           <a:xfrm>
-            <a:off x="756600" y="4168050"/>
+            <a:off x="756600" y="3101250"/>
             <a:ext cx="2799300" cy="311100"/>
           </a:xfrm>
           <a:prstGeom prst="rect">
@@ -13354,7 +13229,7 @@
       </p:sp>
       <p:sp>
         <p:nvSpPr>
-          <p:cNvPr id="166" name="Google Shape;166;p16"/>
+          <p:cNvPr id="165" name="Google Shape;165;p16"/>
           <p:cNvSpPr/>
           <p:nvPr/>
         </p:nvSpPr>
@@ -13430,7 +13305,7 @@
       </p:sp>
       <p:sp>
         <p:nvSpPr>
-          <p:cNvPr id="167" name="Google Shape;167;p16"/>
+          <p:cNvPr id="166" name="Google Shape;166;p16"/>
           <p:cNvSpPr/>
           <p:nvPr/>
         </p:nvSpPr>
@@ -13511,7 +13386,7 @@
       </p:sp>
       <p:sp>
         <p:nvSpPr>
-          <p:cNvPr id="168" name="Google Shape;168;p16"/>
+          <p:cNvPr id="167" name="Google Shape;167;p16"/>
           <p:cNvSpPr/>
           <p:nvPr/>
         </p:nvSpPr>
@@ -13587,7 +13462,7 @@
       </p:sp>
       <p:sp>
         <p:nvSpPr>
-          <p:cNvPr id="169" name="Google Shape;169;p16"/>
+          <p:cNvPr id="168" name="Google Shape;168;p16"/>
           <p:cNvSpPr/>
           <p:nvPr/>
         </p:nvSpPr>
@@ -13639,7 +13514,7 @@
       </p:sp>
       <p:sp>
         <p:nvSpPr>
-          <p:cNvPr id="170" name="Google Shape;170;p16"/>
+          <p:cNvPr id="169" name="Google Shape;169;p16"/>
           <p:cNvSpPr/>
           <p:nvPr/>
         </p:nvSpPr>
@@ -13716,7 +13591,7 @@
       </p:sp>
       <p:sp>
         <p:nvSpPr>
-          <p:cNvPr id="171" name="Google Shape;171;p16"/>
+          <p:cNvPr id="170" name="Google Shape;170;p16"/>
           <p:cNvSpPr/>
           <p:nvPr/>
         </p:nvSpPr>
@@ -13774,17 +13649,17 @@
       </p:sp>
       <p:cxnSp>
         <p:nvCxnSpPr>
-          <p:cNvPr id="172" name="Google Shape;172;p16"/>
+          <p:cNvPr id="171" name="Google Shape;171;p16"/>
           <p:cNvCxnSpPr>
-            <a:stCxn id="147" idx="1"/>
-            <a:endCxn id="154" idx="3"/>
+            <a:stCxn id="148" idx="1"/>
+            <a:endCxn id="155" idx="3"/>
           </p:cNvCxnSpPr>
           <p:nvPr/>
         </p:nvCxnSpPr>
         <p:spPr>
           <a:xfrm flipH="1">
             <a:off x="3649375" y="921150"/>
-            <a:ext cx="519000" cy="1101000"/>
+            <a:ext cx="519000" cy="595200"/>
           </a:xfrm>
           <a:prstGeom prst="straightConnector1">
             <a:avLst/>
@@ -13803,17 +13678,17 @@
       </p:cxnSp>
       <p:cxnSp>
         <p:nvCxnSpPr>
-          <p:cNvPr id="173" name="Google Shape;173;p16"/>
+          <p:cNvPr id="172" name="Google Shape;172;p16"/>
           <p:cNvCxnSpPr>
-            <a:stCxn id="151" idx="1"/>
-            <a:endCxn id="164" idx="3"/>
+            <a:stCxn id="152" idx="1"/>
+            <a:endCxn id="163" idx="3"/>
           </p:cNvCxnSpPr>
           <p:nvPr/>
         </p:nvCxnSpPr>
         <p:spPr>
           <a:xfrm flipH="1">
             <a:off x="3696175" y="2259250"/>
-            <a:ext cx="548400" cy="1812900"/>
+            <a:ext cx="548400" cy="746100"/>
           </a:xfrm>
           <a:prstGeom prst="straightConnector1">
             <a:avLst/>
@@ -13832,10 +13707,10 @@
       </p:cxnSp>
       <p:cxnSp>
         <p:nvCxnSpPr>
-          <p:cNvPr id="174" name="Google Shape;174;p16"/>
+          <p:cNvPr id="173" name="Google Shape;173;p16"/>
           <p:cNvCxnSpPr>
-            <a:stCxn id="153" idx="3"/>
-            <a:endCxn id="166" idx="0"/>
+            <a:stCxn id="154" idx="3"/>
+            <a:endCxn id="165" idx="0"/>
           </p:cNvCxnSpPr>
           <p:nvPr/>
         </p:nvCxnSpPr>
@@ -13864,14 +13739,14 @@
       </p:cxnSp>
       <p:sp>
         <p:nvSpPr>
-          <p:cNvPr id="175" name="Google Shape;175;p16"/>
+          <p:cNvPr id="174" name="Google Shape;174;p16"/>
           <p:cNvSpPr/>
           <p:nvPr/>
         </p:nvSpPr>
         <p:spPr>
           <a:xfrm>
             <a:off x="4007800" y="5042000"/>
-            <a:ext cx="4557300" cy="1245900"/>
+            <a:ext cx="4557300" cy="1442700"/>
           </a:xfrm>
           <a:prstGeom prst="rect">
             <a:avLst/>
@@ -13959,7 +13834,7 @@
       </p:sp>
       <p:sp>
         <p:nvSpPr>
-          <p:cNvPr id="176" name="Google Shape;176;p16"/>
+          <p:cNvPr id="175" name="Google Shape;175;p16"/>
           <p:cNvSpPr/>
           <p:nvPr/>
         </p:nvSpPr>
@@ -14017,14 +13892,14 @@
       </p:sp>
       <p:sp>
         <p:nvSpPr>
-          <p:cNvPr id="177" name="Google Shape;177;p16"/>
+          <p:cNvPr id="176" name="Google Shape;176;p16"/>
           <p:cNvSpPr/>
           <p:nvPr/>
         </p:nvSpPr>
         <p:spPr>
           <a:xfrm>
             <a:off x="4282250" y="5896250"/>
-            <a:ext cx="1964700" cy="311100"/>
+            <a:ext cx="2077200" cy="311100"/>
           </a:xfrm>
           <a:prstGeom prst="rect">
             <a:avLst/>
@@ -14063,7 +13938,7 @@
                   <a:schemeClr val="dk1"/>
                 </a:solidFill>
               </a:rPr>
-              <a:t>Add Paper Grading Sheet</a:t>
+              <a:t>2.Add Paper Grading Sheet</a:t>
             </a:r>
             <a:endParaRPr sz="1200">
               <a:solidFill>
@@ -14075,7 +13950,7 @@
       </p:sp>
       <p:sp>
         <p:nvSpPr>
-          <p:cNvPr id="178" name="Google Shape;178;p16"/>
+          <p:cNvPr id="177" name="Google Shape;177;p16"/>
           <p:cNvSpPr/>
           <p:nvPr/>
         </p:nvSpPr>
@@ -14115,6 +13990,14 @@
               </a:spcAft>
               <a:buNone/>
             </a:pPr>
+            <a:r>
+              <a:rPr lang="de-DE" sz="1200">
+                <a:solidFill>
+                  <a:schemeClr val="dk1"/>
+                </a:solidFill>
+              </a:rPr>
+              <a:t>1.</a:t>
+            </a:r>
             <a:r>
               <a:rPr lang="de-DE" sz="1200">
                 <a:solidFill>
@@ -14133,7 +14016,7 @@
       </p:sp>
       <p:sp>
         <p:nvSpPr>
-          <p:cNvPr id="179" name="Google Shape;179;p16"/>
+          <p:cNvPr id="178" name="Google Shape;178;p16"/>
           <p:cNvSpPr/>
           <p:nvPr/>
         </p:nvSpPr>
@@ -14173,6 +14056,14 @@
               </a:spcAft>
               <a:buNone/>
             </a:pPr>
+            <a:r>
+              <a:rPr lang="de-DE" sz="1200">
+                <a:solidFill>
+                  <a:schemeClr val="dk1"/>
+                </a:solidFill>
+              </a:rPr>
+              <a:t>3.</a:t>
+            </a:r>
             <a:r>
               <a:rPr lang="de-DE" sz="1200">
                 <a:solidFill>
@@ -14191,13 +14082,13 @@
       </p:sp>
       <p:sp>
         <p:nvSpPr>
-          <p:cNvPr id="180" name="Google Shape;180;p16"/>
+          <p:cNvPr id="179" name="Google Shape;179;p16"/>
           <p:cNvSpPr/>
           <p:nvPr/>
         </p:nvSpPr>
         <p:spPr>
           <a:xfrm>
-            <a:off x="564650" y="4737950"/>
+            <a:off x="488450" y="4128350"/>
             <a:ext cx="3057600" cy="1854000"/>
           </a:xfrm>
           <a:prstGeom prst="roundRect">
@@ -14267,13 +14158,13 @@
       </p:sp>
       <p:sp>
         <p:nvSpPr>
-          <p:cNvPr id="181" name="Google Shape;181;p16"/>
+          <p:cNvPr id="180" name="Google Shape;180;p16"/>
           <p:cNvSpPr/>
           <p:nvPr/>
         </p:nvSpPr>
         <p:spPr>
           <a:xfrm>
-            <a:off x="832400" y="5238900"/>
+            <a:off x="756200" y="4629300"/>
             <a:ext cx="2522100" cy="1245900"/>
           </a:xfrm>
           <a:prstGeom prst="rect">
@@ -14319,13 +14210,13 @@
       </p:sp>
       <p:sp>
         <p:nvSpPr>
-          <p:cNvPr id="182" name="Google Shape;182;p16"/>
+          <p:cNvPr id="181" name="Google Shape;181;p16"/>
           <p:cNvSpPr/>
           <p:nvPr/>
         </p:nvSpPr>
         <p:spPr>
           <a:xfrm>
-            <a:off x="940500" y="5279475"/>
+            <a:off x="864300" y="4669875"/>
             <a:ext cx="2251800" cy="519000"/>
           </a:xfrm>
           <a:prstGeom prst="rect">
@@ -14396,13 +14287,13 @@
       </p:sp>
       <p:sp>
         <p:nvSpPr>
-          <p:cNvPr id="183" name="Google Shape;183;p16"/>
+          <p:cNvPr id="182" name="Google Shape;182;p16"/>
           <p:cNvSpPr/>
           <p:nvPr/>
         </p:nvSpPr>
         <p:spPr>
           <a:xfrm>
-            <a:off x="940500" y="5889075"/>
+            <a:off x="827425" y="5264900"/>
             <a:ext cx="2251800" cy="519000"/>
           </a:xfrm>
           <a:prstGeom prst="rect">
@@ -14454,7 +14345,7 @@
       </p:sp>
       <p:sp>
         <p:nvSpPr>
-          <p:cNvPr id="184" name="Google Shape;184;p16"/>
+          <p:cNvPr id="183" name="Google Shape;183;p16"/>
           <p:cNvSpPr/>
           <p:nvPr/>
         </p:nvSpPr>
@@ -14530,7 +14421,7 @@
       </p:sp>
       <p:sp>
         <p:nvSpPr>
-          <p:cNvPr id="185" name="Google Shape;185;p16"/>
+          <p:cNvPr id="184" name="Google Shape;184;p16"/>
           <p:cNvSpPr/>
           <p:nvPr/>
         </p:nvSpPr>
@@ -14582,7 +14473,7 @@
       </p:sp>
       <p:sp>
         <p:nvSpPr>
-          <p:cNvPr id="186" name="Google Shape;186;p16"/>
+          <p:cNvPr id="185" name="Google Shape;185;p16"/>
           <p:cNvSpPr/>
           <p:nvPr/>
         </p:nvSpPr>
@@ -14659,7 +14550,7 @@
       </p:sp>
       <p:sp>
         <p:nvSpPr>
-          <p:cNvPr id="187" name="Google Shape;187;p16"/>
+          <p:cNvPr id="186" name="Google Shape;186;p16"/>
           <p:cNvSpPr/>
           <p:nvPr/>
         </p:nvSpPr>
@@ -14717,10 +14608,10 @@
       </p:sp>
       <p:cxnSp>
         <p:nvCxnSpPr>
-          <p:cNvPr id="188" name="Google Shape;188;p16"/>
+          <p:cNvPr id="187" name="Google Shape;187;p16"/>
           <p:cNvCxnSpPr>
-            <a:stCxn id="150" idx="3"/>
-            <a:endCxn id="159" idx="1"/>
+            <a:stCxn id="151" idx="3"/>
+            <a:endCxn id="158" idx="1"/>
           </p:cNvCxnSpPr>
           <p:nvPr/>
         </p:nvCxnSpPr>
@@ -14746,14 +14637,14 @@
       </p:cxnSp>
       <p:sp>
         <p:nvSpPr>
-          <p:cNvPr id="189" name="Google Shape;189;p16"/>
+          <p:cNvPr id="188" name="Google Shape;188;p16"/>
           <p:cNvSpPr/>
           <p:nvPr/>
         </p:nvSpPr>
         <p:spPr>
           <a:xfrm>
             <a:off x="6420175" y="5903600"/>
-            <a:ext cx="1893000" cy="311100"/>
+            <a:ext cx="2035500" cy="519000"/>
           </a:xfrm>
           <a:prstGeom prst="rect">
             <a:avLst/>
@@ -14786,6 +14677,14 @@
               </a:spcAft>
               <a:buNone/>
             </a:pPr>
+            <a:r>
+              <a:rPr lang="de-DE" sz="1200">
+                <a:solidFill>
+                  <a:schemeClr val="dk1"/>
+                </a:solidFill>
+              </a:rPr>
+              <a:t>4. </a:t>
+            </a:r>
             <a:r>
               <a:rPr lang="de-DE" sz="1200">
                 <a:solidFill>
@@ -14804,7 +14703,7 @@
       </p:sp>
       <p:sp>
         <p:nvSpPr>
-          <p:cNvPr id="190" name="Google Shape;190;p16"/>
+          <p:cNvPr id="189" name="Google Shape;189;p16"/>
           <p:cNvSpPr/>
           <p:nvPr/>
         </p:nvSpPr>
@@ -14880,7 +14779,7 @@
       </p:sp>
       <p:sp>
         <p:nvSpPr>
-          <p:cNvPr id="191" name="Google Shape;191;p16"/>
+          <p:cNvPr id="190" name="Google Shape;190;p16"/>
           <p:cNvSpPr/>
           <p:nvPr/>
         </p:nvSpPr>
@@ -14932,7 +14831,7 @@
       </p:sp>
       <p:sp>
         <p:nvSpPr>
-          <p:cNvPr id="192" name="Google Shape;192;p16"/>
+          <p:cNvPr id="191" name="Google Shape;191;p16"/>
           <p:cNvSpPr/>
           <p:nvPr/>
         </p:nvSpPr>
@@ -15009,7 +14908,7 @@
       </p:sp>
       <p:sp>
         <p:nvSpPr>
-          <p:cNvPr id="193" name="Google Shape;193;p16"/>
+          <p:cNvPr id="192" name="Google Shape;192;p16"/>
           <p:cNvSpPr/>
           <p:nvPr/>
         </p:nvSpPr>
@@ -15067,10 +14966,10 @@
       </p:sp>
       <p:cxnSp>
         <p:nvCxnSpPr>
-          <p:cNvPr id="194" name="Google Shape;194;p16"/>
+          <p:cNvPr id="193" name="Google Shape;193;p16"/>
           <p:cNvCxnSpPr>
-            <a:stCxn id="178" idx="3"/>
-            <a:endCxn id="168" idx="2"/>
+            <a:stCxn id="177" idx="3"/>
+            <a:endCxn id="167" idx="2"/>
           </p:cNvCxnSpPr>
           <p:nvPr/>
         </p:nvCxnSpPr>
@@ -15096,17 +14995,17 @@
       </p:cxnSp>
       <p:cxnSp>
         <p:nvCxnSpPr>
-          <p:cNvPr id="195" name="Google Shape;195;p16"/>
+          <p:cNvPr id="194" name="Google Shape;194;p16"/>
           <p:cNvCxnSpPr>
-            <a:stCxn id="177" idx="1"/>
-            <a:endCxn id="180" idx="3"/>
+            <a:stCxn id="176" idx="1"/>
+            <a:endCxn id="179" idx="3"/>
           </p:cNvCxnSpPr>
           <p:nvPr/>
         </p:nvCxnSpPr>
         <p:spPr>
           <a:xfrm rot="10800000">
-            <a:off x="3622250" y="5665100"/>
-            <a:ext cx="660000" cy="386700"/>
+            <a:off x="3546050" y="5055500"/>
+            <a:ext cx="736200" cy="996300"/>
           </a:xfrm>
           <a:prstGeom prst="straightConnector1">
             <a:avLst/>
@@ -15125,10 +15024,10 @@
       </p:cxnSp>
       <p:cxnSp>
         <p:nvCxnSpPr>
-          <p:cNvPr id="196" name="Google Shape;196;p16"/>
+          <p:cNvPr id="195" name="Google Shape;195;p16"/>
           <p:cNvCxnSpPr>
-            <a:stCxn id="179" idx="3"/>
-            <a:endCxn id="184" idx="2"/>
+            <a:stCxn id="178" idx="3"/>
+            <a:endCxn id="183" idx="2"/>
           </p:cNvCxnSpPr>
           <p:nvPr/>
         </p:nvCxnSpPr>
@@ -15154,23 +15053,20 @@
       </p:cxnSp>
       <p:cxnSp>
         <p:nvCxnSpPr>
-          <p:cNvPr id="197" name="Google Shape;197;p16"/>
+          <p:cNvPr id="196" name="Google Shape;196;p16"/>
           <p:cNvCxnSpPr>
-            <a:stCxn id="189" idx="3"/>
-            <a:endCxn id="190" idx="2"/>
+            <a:stCxn id="188" idx="3"/>
+            <a:endCxn id="189" idx="2"/>
           </p:cNvCxnSpPr>
           <p:nvPr/>
         </p:nvCxnSpPr>
         <p:spPr>
-          <a:xfrm>
-            <a:off x="8313175" y="6059150"/>
-            <a:ext cx="2333400" cy="86700"/>
-          </a:xfrm>
-          <a:prstGeom prst="bentConnector4">
-            <a:avLst>
-              <a:gd fmla="val 17242" name="adj1"/>
-              <a:gd fmla="val 374712" name="adj2"/>
-            </a:avLst>
+          <a:xfrm flipH="1" rot="10800000">
+            <a:off x="8455675" y="6146000"/>
+            <a:ext cx="2190900" cy="17100"/>
+          </a:xfrm>
+          <a:prstGeom prst="bentConnector2">
+            <a:avLst/>
           </a:prstGeom>
           <a:noFill/>
           <a:ln cap="flat" cmpd="sng" w="9525">

</xml_diff>